<commit_message>
- Added project summary
</commit_message>
<xml_diff>
--- a/VariableResolutionFigures.pptx
+++ b/VariableResolutionFigures.pptx
@@ -8,6 +8,7 @@
     <p:sldId id="257" r:id="rId2"/>
     <p:sldId id="258" r:id="rId3"/>
     <p:sldId id="259" r:id="rId4"/>
+    <p:sldId id="260" r:id="rId5"/>
   </p:sldIdLst>
   <p:sldSz cx="9144000" cy="6858000" type="screen4x3"/>
   <p:notesSz cx="6858000" cy="9144000"/>
@@ -4134,6 +4135,417 @@
     <p:extLst>
       <p:ext uri="{BB962C8B-B14F-4D97-AF65-F5344CB8AC3E}">
         <p14:creationId xmlns:p14="http://schemas.microsoft.com/office/powerpoint/2010/main" val="1149822938"/>
+      </p:ext>
+    </p:extLst>
+  </p:cSld>
+  <p:clrMapOvr>
+    <a:masterClrMapping/>
+  </p:clrMapOvr>
+  <p:timing>
+    <p:tnLst>
+      <p:par>
+        <p:cTn xmlns:p14="http://schemas.microsoft.com/office/powerpoint/2010/main" id="1" dur="indefinite" restart="never" nodeType="tmRoot"/>
+      </p:par>
+    </p:tnLst>
+  </p:timing>
+</p:sld>
+</file>
+
+<file path=ppt/slides/slide4.xml><?xml version="1.0" encoding="utf-8"?>
+<p:sld xmlns:a="http://schemas.openxmlformats.org/drawingml/2006/main" xmlns:r="http://schemas.openxmlformats.org/officeDocument/2006/relationships" xmlns:p="http://schemas.openxmlformats.org/presentationml/2006/main">
+  <p:cSld>
+    <p:spTree>
+      <p:nvGrpSpPr>
+        <p:cNvPr id="1" name=""/>
+        <p:cNvGrpSpPr/>
+        <p:nvPr/>
+      </p:nvGrpSpPr>
+      <p:grpSpPr>
+        <a:xfrm>
+          <a:off x="0" y="0"/>
+          <a:ext cx="0" cy="0"/>
+          <a:chOff x="0" y="0"/>
+          <a:chExt cx="0" cy="0"/>
+        </a:xfrm>
+      </p:grpSpPr>
+      <p:pic>
+        <p:nvPicPr>
+          <p:cNvPr id="3" name="Picture 2" descr="SWE_DJFavg_Proposal2.pdf"/>
+          <p:cNvPicPr>
+            <a:picLocks noChangeAspect="1"/>
+          </p:cNvPicPr>
+          <p:nvPr/>
+        </p:nvPicPr>
+        <p:blipFill rotWithShape="1">
+          <a:blip r:embed="rId2">
+            <a:extLst>
+              <a:ext uri="{28A0092B-C50C-407E-A947-70E740481C1C}">
+                <a14:useLocalDpi xmlns:a14="http://schemas.microsoft.com/office/drawing/2010/main" val="0"/>
+              </a:ext>
+            </a:extLst>
+          </a:blip>
+          <a:srcRect t="34876" b="36540"/>
+          <a:stretch/>
+        </p:blipFill>
+        <p:spPr>
+          <a:xfrm>
+            <a:off x="-284611" y="875356"/>
+            <a:ext cx="9698843" cy="3587738"/>
+          </a:xfrm>
+          <a:prstGeom prst="rect">
+            <a:avLst/>
+          </a:prstGeom>
+        </p:spPr>
+      </p:pic>
+      <p:sp>
+        <p:nvSpPr>
+          <p:cNvPr id="4" name="Rectangle 3"/>
+          <p:cNvSpPr/>
+          <p:nvPr/>
+        </p:nvSpPr>
+        <p:spPr>
+          <a:xfrm>
+            <a:off x="-98639" y="1097280"/>
+            <a:ext cx="9144000" cy="493160"/>
+          </a:xfrm>
+          <a:prstGeom prst="rect">
+            <a:avLst/>
+          </a:prstGeom>
+          <a:solidFill>
+            <a:srgbClr val="FFFFFF"/>
+          </a:solidFill>
+          <a:ln>
+            <a:noFill/>
+          </a:ln>
+          <a:effectLst/>
+        </p:spPr>
+        <p:style>
+          <a:lnRef idx="1">
+            <a:schemeClr val="accent1"/>
+          </a:lnRef>
+          <a:fillRef idx="3">
+            <a:schemeClr val="accent1"/>
+          </a:fillRef>
+          <a:effectRef idx="2">
+            <a:schemeClr val="accent1"/>
+          </a:effectRef>
+          <a:fontRef idx="minor">
+            <a:schemeClr val="lt1"/>
+          </a:fontRef>
+        </p:style>
+        <p:txBody>
+          <a:bodyPr rtlCol="0" anchor="ctr"/>
+          <a:lstStyle/>
+          <a:p>
+            <a:pPr algn="ctr"/>
+            <a:endParaRPr lang="en-US"/>
+          </a:p>
+        </p:txBody>
+      </p:sp>
+      <p:sp>
+        <p:nvSpPr>
+          <p:cNvPr id="7" name="Rounded Rectangle 6"/>
+          <p:cNvSpPr/>
+          <p:nvPr/>
+        </p:nvSpPr>
+        <p:spPr>
+          <a:xfrm>
+            <a:off x="295909" y="1311049"/>
+            <a:ext cx="1719072" cy="386083"/>
+          </a:xfrm>
+          <a:prstGeom prst="roundRect">
+            <a:avLst/>
+          </a:prstGeom>
+        </p:spPr>
+        <p:style>
+          <a:lnRef idx="1">
+            <a:schemeClr val="dk1"/>
+          </a:lnRef>
+          <a:fillRef idx="2">
+            <a:schemeClr val="dk1"/>
+          </a:fillRef>
+          <a:effectRef idx="1">
+            <a:schemeClr val="dk1"/>
+          </a:effectRef>
+          <a:fontRef idx="minor">
+            <a:schemeClr val="dk1"/>
+          </a:fontRef>
+        </p:style>
+        <p:txBody>
+          <a:bodyPr rtlCol="0" anchor="ctr"/>
+          <a:lstStyle/>
+          <a:p>
+            <a:pPr algn="ctr"/>
+            <a:r>
+              <a:rPr lang="en-US" sz="1500" dirty="0" smtClean="0"/>
+              <a:t>CESM </a:t>
+            </a:r>
+            <a:r>
+              <a:rPr lang="en-US" sz="1500" dirty="0" smtClean="0"/>
+              <a:t>Uniform 1°</a:t>
+            </a:r>
+            <a:endParaRPr lang="en-US" sz="1500" dirty="0"/>
+          </a:p>
+        </p:txBody>
+      </p:sp>
+      <p:sp>
+        <p:nvSpPr>
+          <p:cNvPr id="8" name="Rounded Rectangle 7"/>
+          <p:cNvSpPr/>
+          <p:nvPr/>
+        </p:nvSpPr>
+        <p:spPr>
+          <a:xfrm>
+            <a:off x="2046725" y="1311049"/>
+            <a:ext cx="1719072" cy="386083"/>
+          </a:xfrm>
+          <a:prstGeom prst="roundRect">
+            <a:avLst/>
+          </a:prstGeom>
+        </p:spPr>
+        <p:style>
+          <a:lnRef idx="1">
+            <a:schemeClr val="dk1"/>
+          </a:lnRef>
+          <a:fillRef idx="2">
+            <a:schemeClr val="dk1"/>
+          </a:fillRef>
+          <a:effectRef idx="1">
+            <a:schemeClr val="dk1"/>
+          </a:effectRef>
+          <a:fontRef idx="minor">
+            <a:schemeClr val="dk1"/>
+          </a:fontRef>
+        </p:style>
+        <p:txBody>
+          <a:bodyPr rtlCol="0" anchor="ctr"/>
+          <a:lstStyle/>
+          <a:p>
+            <a:pPr algn="ctr"/>
+            <a:r>
+              <a:rPr lang="en-US" sz="1500" dirty="0" smtClean="0"/>
+              <a:t>CESM </a:t>
+            </a:r>
+            <a:r>
+              <a:rPr lang="en-US" sz="1500" dirty="0" err="1" smtClean="0"/>
+              <a:t>VarRes</a:t>
+            </a:r>
+            <a:r>
+              <a:rPr lang="en-US" sz="1500" dirty="0" smtClean="0"/>
+              <a:t> 28km</a:t>
+            </a:r>
+            <a:endParaRPr lang="en-US" sz="1500" dirty="0"/>
+          </a:p>
+        </p:txBody>
+      </p:sp>
+      <p:sp>
+        <p:nvSpPr>
+          <p:cNvPr id="9" name="Rounded Rectangle 8"/>
+          <p:cNvSpPr/>
+          <p:nvPr/>
+        </p:nvSpPr>
+        <p:spPr>
+          <a:xfrm>
+            <a:off x="3797722" y="1311049"/>
+            <a:ext cx="1801368" cy="386083"/>
+          </a:xfrm>
+          <a:prstGeom prst="roundRect">
+            <a:avLst/>
+          </a:prstGeom>
+        </p:spPr>
+        <p:style>
+          <a:lnRef idx="1">
+            <a:schemeClr val="dk1"/>
+          </a:lnRef>
+          <a:fillRef idx="2">
+            <a:schemeClr val="dk1"/>
+          </a:fillRef>
+          <a:effectRef idx="1">
+            <a:schemeClr val="dk1"/>
+          </a:effectRef>
+          <a:fontRef idx="minor">
+            <a:schemeClr val="dk1"/>
+          </a:fontRef>
+        </p:style>
+        <p:txBody>
+          <a:bodyPr rtlCol="0" anchor="ctr"/>
+          <a:lstStyle/>
+          <a:p>
+            <a:pPr algn="ctr"/>
+            <a:r>
+              <a:rPr lang="en-US" sz="1500" dirty="0" smtClean="0"/>
+              <a:t>CESM </a:t>
+            </a:r>
+            <a:r>
+              <a:rPr lang="en-US" sz="1500" dirty="0" err="1" smtClean="0"/>
+              <a:t>VarRes</a:t>
+            </a:r>
+            <a:r>
+              <a:rPr lang="en-US" sz="1500" dirty="0" smtClean="0"/>
+              <a:t> 14km</a:t>
+            </a:r>
+            <a:endParaRPr lang="en-US" sz="1500" dirty="0"/>
+          </a:p>
+        </p:txBody>
+      </p:sp>
+      <p:sp>
+        <p:nvSpPr>
+          <p:cNvPr id="11" name="Rounded Rectangle 10"/>
+          <p:cNvSpPr/>
+          <p:nvPr/>
+        </p:nvSpPr>
+        <p:spPr>
+          <a:xfrm>
+            <a:off x="5630048" y="1311049"/>
+            <a:ext cx="1664208" cy="386083"/>
+          </a:xfrm>
+          <a:prstGeom prst="roundRect">
+            <a:avLst/>
+          </a:prstGeom>
+          <a:ln>
+            <a:solidFill>
+              <a:schemeClr val="tx1"/>
+            </a:solidFill>
+          </a:ln>
+        </p:spPr>
+        <p:style>
+          <a:lnRef idx="1">
+            <a:schemeClr val="accent1"/>
+          </a:lnRef>
+          <a:fillRef idx="2">
+            <a:schemeClr val="accent1"/>
+          </a:fillRef>
+          <a:effectRef idx="1">
+            <a:schemeClr val="accent1"/>
+          </a:effectRef>
+          <a:fontRef idx="minor">
+            <a:schemeClr val="dk1"/>
+          </a:fontRef>
+        </p:style>
+        <p:txBody>
+          <a:bodyPr rtlCol="0" anchor="ctr"/>
+          <a:lstStyle/>
+          <a:p>
+            <a:pPr algn="ctr"/>
+            <a:r>
+              <a:rPr lang="en-US" sz="1500" dirty="0" smtClean="0"/>
+              <a:t>NCEP 35km</a:t>
+            </a:r>
+            <a:endParaRPr lang="en-US" sz="1500" dirty="0"/>
+          </a:p>
+        </p:txBody>
+      </p:sp>
+      <p:sp>
+        <p:nvSpPr>
+          <p:cNvPr id="12" name="Rounded Rectangle 11"/>
+          <p:cNvSpPr/>
+          <p:nvPr/>
+        </p:nvSpPr>
+        <p:spPr>
+          <a:xfrm>
+            <a:off x="7323829" y="1311049"/>
+            <a:ext cx="1700784" cy="386083"/>
+          </a:xfrm>
+          <a:prstGeom prst="roundRect">
+            <a:avLst/>
+          </a:prstGeom>
+          <a:ln>
+            <a:solidFill>
+              <a:schemeClr val="tx1"/>
+            </a:solidFill>
+          </a:ln>
+        </p:spPr>
+        <p:style>
+          <a:lnRef idx="1">
+            <a:schemeClr val="accent1"/>
+          </a:lnRef>
+          <a:fillRef idx="2">
+            <a:schemeClr val="accent1"/>
+          </a:fillRef>
+          <a:effectRef idx="1">
+            <a:schemeClr val="accent1"/>
+          </a:effectRef>
+          <a:fontRef idx="minor">
+            <a:schemeClr val="dk1"/>
+          </a:fontRef>
+        </p:style>
+        <p:txBody>
+          <a:bodyPr rtlCol="0" anchor="ctr"/>
+          <a:lstStyle/>
+          <a:p>
+            <a:pPr algn="ctr"/>
+            <a:r>
+              <a:rPr lang="en-US" sz="1500" dirty="0" smtClean="0"/>
+              <a:t>DAYMET 1km</a:t>
+            </a:r>
+            <a:endParaRPr lang="en-US" sz="1500" dirty="0"/>
+          </a:p>
+        </p:txBody>
+      </p:sp>
+      <p:sp>
+        <p:nvSpPr>
+          <p:cNvPr id="22" name="TextBox 21"/>
+          <p:cNvSpPr txBox="1"/>
+          <p:nvPr/>
+        </p:nvSpPr>
+        <p:spPr>
+          <a:xfrm>
+            <a:off x="1126775" y="801382"/>
+            <a:ext cx="7158767" cy="430887"/>
+          </a:xfrm>
+          <a:prstGeom prst="rect">
+            <a:avLst/>
+          </a:prstGeom>
+          <a:solidFill>
+            <a:schemeClr val="bg1"/>
+          </a:solidFill>
+        </p:spPr>
+        <p:txBody>
+          <a:bodyPr wrap="square" rtlCol="0">
+            <a:spAutoFit/>
+          </a:bodyPr>
+          <a:lstStyle/>
+          <a:p>
+            <a:pPr algn="ctr"/>
+            <a:r>
+              <a:rPr lang="en-US" sz="2200" dirty="0" smtClean="0">
+                <a:latin typeface="Helvetica"/>
+                <a:cs typeface="Helvetica"/>
+              </a:rPr>
+              <a:t>Average </a:t>
+            </a:r>
+            <a:r>
+              <a:rPr lang="en-US" sz="2200" dirty="0" smtClean="0">
+                <a:latin typeface="Helvetica"/>
+                <a:cs typeface="Helvetica"/>
+              </a:rPr>
+              <a:t>DJF Snow Water Equivalent </a:t>
+            </a:r>
+            <a:r>
+              <a:rPr lang="en-US" sz="2200" dirty="0" smtClean="0">
+                <a:latin typeface="Helvetica"/>
+                <a:cs typeface="Helvetica"/>
+              </a:rPr>
+              <a:t>1980-1986 (</a:t>
+            </a:r>
+            <a:r>
+              <a:rPr lang="en-US" sz="2200" dirty="0" smtClean="0">
+                <a:latin typeface="Helvetica"/>
+                <a:cs typeface="Helvetica"/>
+              </a:rPr>
+              <a:t>mm)</a:t>
+            </a:r>
+            <a:endParaRPr lang="en-US" sz="2200" dirty="0">
+              <a:latin typeface="Helvetica"/>
+              <a:cs typeface="Helvetica"/>
+            </a:endParaRPr>
+          </a:p>
+        </p:txBody>
+      </p:sp>
+    </p:spTree>
+    <p:extLst>
+      <p:ext uri="{BB962C8B-B14F-4D97-AF65-F5344CB8AC3E}">
+        <p14:creationId xmlns:p14="http://schemas.microsoft.com/office/powerpoint/2010/main" val="4281119654"/>
       </p:ext>
     </p:extLst>
   </p:cSld>

</xml_diff>